<commit_message>
service, Http service, Observables & Promises
</commit_message>
<xml_diff>
--- a/src/assets/AngularByRaharshi.pptx
+++ b/src/assets/AngularByRaharshi.pptx
@@ -20,6 +20,13 @@
     <p:sldId id="268" r:id="rId14"/>
     <p:sldId id="269" r:id="rId15"/>
     <p:sldId id="270" r:id="rId16"/>
+    <p:sldId id="271" r:id="rId17"/>
+    <p:sldId id="273" r:id="rId18"/>
+    <p:sldId id="275" r:id="rId19"/>
+    <p:sldId id="276" r:id="rId20"/>
+    <p:sldId id="277" r:id="rId21"/>
+    <p:sldId id="278" r:id="rId22"/>
+    <p:sldId id="279" r:id="rId23"/>
   </p:sldIdLst>
   <p:sldSz cx="12192000" cy="6858000"/>
   <p:notesSz cx="6858000" cy="9144000"/>
@@ -275,7 +282,7 @@
           <a:p>
             <a:fld id="{5D6E5462-925E-44B2-A644-3CEFCF02BF6A}" type="datetimeFigureOut">
               <a:rPr lang="en-IN" smtClean="0"/>
-              <a:t>02-07-2022</a:t>
+              <a:t>05-07-2022</a:t>
             </a:fld>
             <a:endParaRPr lang="en-IN"/>
           </a:p>
@@ -475,7 +482,7 @@
           <a:p>
             <a:fld id="{5D6E5462-925E-44B2-A644-3CEFCF02BF6A}" type="datetimeFigureOut">
               <a:rPr lang="en-IN" smtClean="0"/>
-              <a:t>02-07-2022</a:t>
+              <a:t>05-07-2022</a:t>
             </a:fld>
             <a:endParaRPr lang="en-IN"/>
           </a:p>
@@ -685,7 +692,7 @@
           <a:p>
             <a:fld id="{5D6E5462-925E-44B2-A644-3CEFCF02BF6A}" type="datetimeFigureOut">
               <a:rPr lang="en-IN" smtClean="0"/>
-              <a:t>02-07-2022</a:t>
+              <a:t>05-07-2022</a:t>
             </a:fld>
             <a:endParaRPr lang="en-IN"/>
           </a:p>
@@ -885,7 +892,7 @@
           <a:p>
             <a:fld id="{5D6E5462-925E-44B2-A644-3CEFCF02BF6A}" type="datetimeFigureOut">
               <a:rPr lang="en-IN" smtClean="0"/>
-              <a:t>02-07-2022</a:t>
+              <a:t>05-07-2022</a:t>
             </a:fld>
             <a:endParaRPr lang="en-IN"/>
           </a:p>
@@ -1161,7 +1168,7 @@
           <a:p>
             <a:fld id="{5D6E5462-925E-44B2-A644-3CEFCF02BF6A}" type="datetimeFigureOut">
               <a:rPr lang="en-IN" smtClean="0"/>
-              <a:t>02-07-2022</a:t>
+              <a:t>05-07-2022</a:t>
             </a:fld>
             <a:endParaRPr lang="en-IN"/>
           </a:p>
@@ -1429,7 +1436,7 @@
           <a:p>
             <a:fld id="{5D6E5462-925E-44B2-A644-3CEFCF02BF6A}" type="datetimeFigureOut">
               <a:rPr lang="en-IN" smtClean="0"/>
-              <a:t>02-07-2022</a:t>
+              <a:t>05-07-2022</a:t>
             </a:fld>
             <a:endParaRPr lang="en-IN"/>
           </a:p>
@@ -1844,7 +1851,7 @@
           <a:p>
             <a:fld id="{5D6E5462-925E-44B2-A644-3CEFCF02BF6A}" type="datetimeFigureOut">
               <a:rPr lang="en-IN" smtClean="0"/>
-              <a:t>02-07-2022</a:t>
+              <a:t>05-07-2022</a:t>
             </a:fld>
             <a:endParaRPr lang="en-IN"/>
           </a:p>
@@ -1986,7 +1993,7 @@
           <a:p>
             <a:fld id="{5D6E5462-925E-44B2-A644-3CEFCF02BF6A}" type="datetimeFigureOut">
               <a:rPr lang="en-IN" smtClean="0"/>
-              <a:t>02-07-2022</a:t>
+              <a:t>05-07-2022</a:t>
             </a:fld>
             <a:endParaRPr lang="en-IN"/>
           </a:p>
@@ -2099,7 +2106,7 @@
           <a:p>
             <a:fld id="{5D6E5462-925E-44B2-A644-3CEFCF02BF6A}" type="datetimeFigureOut">
               <a:rPr lang="en-IN" smtClean="0"/>
-              <a:t>02-07-2022</a:t>
+              <a:t>05-07-2022</a:t>
             </a:fld>
             <a:endParaRPr lang="en-IN"/>
           </a:p>
@@ -2412,7 +2419,7 @@
           <a:p>
             <a:fld id="{5D6E5462-925E-44B2-A644-3CEFCF02BF6A}" type="datetimeFigureOut">
               <a:rPr lang="en-IN" smtClean="0"/>
-              <a:t>02-07-2022</a:t>
+              <a:t>05-07-2022</a:t>
             </a:fld>
             <a:endParaRPr lang="en-IN"/>
           </a:p>
@@ -2701,7 +2708,7 @@
           <a:p>
             <a:fld id="{5D6E5462-925E-44B2-A644-3CEFCF02BF6A}" type="datetimeFigureOut">
               <a:rPr lang="en-IN" smtClean="0"/>
-              <a:t>02-07-2022</a:t>
+              <a:t>05-07-2022</a:t>
             </a:fld>
             <a:endParaRPr lang="en-IN"/>
           </a:p>
@@ -2944,7 +2951,7 @@
           <a:p>
             <a:fld id="{5D6E5462-925E-44B2-A644-3CEFCF02BF6A}" type="datetimeFigureOut">
               <a:rPr lang="en-IN" smtClean="0"/>
-              <a:t>02-07-2022</a:t>
+              <a:t>05-07-2022</a:t>
             </a:fld>
             <a:endParaRPr lang="en-IN"/>
           </a:p>
@@ -4193,7 +4200,7 @@
           </a:p>
           <a:p>
             <a:r>
-              <a:rPr lang="en-IN"/>
+              <a:rPr lang="en-IN" dirty="0"/>
               <a:t>Import Reactive Forms</a:t>
             </a:r>
           </a:p>
@@ -4279,7 +4286,10 @@
           <a:lstStyle/>
           <a:p>
             <a:pPr algn="l"/>
-            <a:endParaRPr lang="en-IN" sz="5400" b="1" dirty="0"/>
+            <a:r>
+              <a:rPr lang="en-IN" sz="5400" b="1" dirty="0"/>
+              <a:t>Services</a:t>
+            </a:r>
           </a:p>
         </p:txBody>
       </p:sp>
@@ -4303,6 +4313,62 @@
         <p:txBody>
           <a:bodyPr/>
           <a:lstStyle/>
+          <a:p>
+            <a:r>
+              <a:rPr lang="en-IN" dirty="0"/>
+              <a:t>Centralized location of data</a:t>
+            </a:r>
+          </a:p>
+          <a:p>
+            <a:r>
+              <a:rPr lang="en-IN" dirty="0"/>
+              <a:t>Share data across the application</a:t>
+            </a:r>
+          </a:p>
+          <a:p>
+            <a:r>
+              <a:rPr lang="en-IN" dirty="0"/>
+              <a:t>Data consistency</a:t>
+            </a:r>
+          </a:p>
+          <a:p>
+            <a:r>
+              <a:rPr lang="en-IN" dirty="0"/>
+              <a:t>Reduce static code</a:t>
+            </a:r>
+          </a:p>
+          <a:p>
+            <a:r>
+              <a:rPr lang="en-IN" dirty="0"/>
+              <a:t>Register Service in Module</a:t>
+            </a:r>
+          </a:p>
+          <a:p>
+            <a:r>
+              <a:rPr lang="en-IN" dirty="0"/>
+              <a:t>Injectable</a:t>
+            </a:r>
+          </a:p>
+          <a:p>
+            <a:r>
+              <a:rPr lang="en-IN" dirty="0"/>
+              <a:t>Inject</a:t>
+            </a:r>
+          </a:p>
+          <a:p>
+            <a:r>
+              <a:rPr lang="en-IN" dirty="0"/>
+              <a:t>ng g s &lt;</a:t>
+            </a:r>
+            <a:r>
+              <a:rPr lang="en-IN" dirty="0" err="1"/>
+              <a:t>service_name</a:t>
+            </a:r>
+            <a:r>
+              <a:rPr lang="en-IN" dirty="0"/>
+              <a:t>&gt;</a:t>
+            </a:r>
+          </a:p>
           <a:p>
             <a:endParaRPr lang="en-IN" dirty="0"/>
           </a:p>
@@ -4312,6 +4378,1039 @@
     <p:extLst>
       <p:ext uri="{BB962C8B-B14F-4D97-AF65-F5344CB8AC3E}">
         <p14:creationId xmlns:p14="http://schemas.microsoft.com/office/powerpoint/2010/main" val="1322060030"/>
+      </p:ext>
+    </p:extLst>
+  </p:cSld>
+  <p:clrMapOvr>
+    <a:masterClrMapping/>
+  </p:clrMapOvr>
+</p:sld>
+</file>
+
+<file path=ppt/slides/slide16.xml><?xml version="1.0" encoding="utf-8"?>
+<p:sld xmlns:a="http://schemas.openxmlformats.org/drawingml/2006/main" xmlns:r="http://schemas.openxmlformats.org/officeDocument/2006/relationships" xmlns:p="http://schemas.openxmlformats.org/presentationml/2006/main">
+  <p:cSld>
+    <p:bg>
+      <p:bgPr>
+        <a:blipFill dpi="0" rotWithShape="1">
+          <a:blip r:embed="rId2">
+            <a:lum/>
+          </a:blip>
+          <a:srcRect/>
+          <a:stretch>
+            <a:fillRect l="-3000" r="-3000"/>
+          </a:stretch>
+        </a:blipFill>
+        <a:effectLst/>
+      </p:bgPr>
+    </p:bg>
+    <p:spTree>
+      <p:nvGrpSpPr>
+        <p:cNvPr id="1" name=""/>
+        <p:cNvGrpSpPr/>
+        <p:nvPr/>
+      </p:nvGrpSpPr>
+      <p:grpSpPr>
+        <a:xfrm>
+          <a:off x="0" y="0"/>
+          <a:ext cx="0" cy="0"/>
+          <a:chOff x="0" y="0"/>
+          <a:chExt cx="0" cy="0"/>
+        </a:xfrm>
+      </p:grpSpPr>
+      <p:sp>
+        <p:nvSpPr>
+          <p:cNvPr id="2" name="Title 1">
+            <a:extLst>
+              <a:ext uri="{FF2B5EF4-FFF2-40B4-BE49-F238E27FC236}">
+                <a16:creationId xmlns:a16="http://schemas.microsoft.com/office/drawing/2014/main" id="{7D51799D-4E26-BEC4-533A-E441F51DFF60}"/>
+              </a:ext>
+            </a:extLst>
+          </p:cNvPr>
+          <p:cNvSpPr>
+            <a:spLocks noGrp="1"/>
+          </p:cNvSpPr>
+          <p:nvPr>
+            <p:ph type="title"/>
+          </p:nvPr>
+        </p:nvSpPr>
+        <p:spPr/>
+        <p:txBody>
+          <a:bodyPr>
+            <a:normAutofit/>
+          </a:bodyPr>
+          <a:lstStyle/>
+          <a:p>
+            <a:pPr algn="l"/>
+            <a:r>
+              <a:rPr lang="en-IN" sz="5400" b="1" dirty="0"/>
+              <a:t>Http Service</a:t>
+            </a:r>
+          </a:p>
+        </p:txBody>
+      </p:sp>
+      <p:sp>
+        <p:nvSpPr>
+          <p:cNvPr id="4" name="Content Placeholder 3">
+            <a:extLst>
+              <a:ext uri="{FF2B5EF4-FFF2-40B4-BE49-F238E27FC236}">
+                <a16:creationId xmlns:a16="http://schemas.microsoft.com/office/drawing/2014/main" id="{FDD5958A-281A-314D-BF1A-CB03B73B1726}"/>
+              </a:ext>
+            </a:extLst>
+          </p:cNvPr>
+          <p:cNvSpPr>
+            <a:spLocks noGrp="1"/>
+          </p:cNvSpPr>
+          <p:nvPr>
+            <p:ph idx="1"/>
+          </p:nvPr>
+        </p:nvSpPr>
+        <p:spPr/>
+        <p:txBody>
+          <a:bodyPr/>
+          <a:lstStyle/>
+          <a:p>
+            <a:r>
+              <a:rPr lang="en-IN" dirty="0"/>
+              <a:t>Http Call &amp; Rest API URL</a:t>
+            </a:r>
+          </a:p>
+          <a:p>
+            <a:r>
+              <a:rPr lang="en-IN" dirty="0"/>
+              <a:t>HttpClientModule from @angular/common/http</a:t>
+            </a:r>
+          </a:p>
+          <a:p>
+            <a:r>
+              <a:rPr lang="en-IN" dirty="0"/>
+              <a:t>Inject HttpClient</a:t>
+            </a:r>
+          </a:p>
+          <a:p>
+            <a:r>
+              <a:rPr lang="en-IN" dirty="0"/>
+              <a:t>Get, Post, Put, Delete</a:t>
+            </a:r>
+          </a:p>
+          <a:p>
+            <a:r>
+              <a:rPr lang="en-IN" dirty="0"/>
+              <a:t>Async Calls</a:t>
+            </a:r>
+          </a:p>
+          <a:p>
+            <a:r>
+              <a:rPr lang="en-IN" dirty="0"/>
+              <a:t>Observable</a:t>
+            </a:r>
+          </a:p>
+          <a:p>
+            <a:r>
+              <a:rPr lang="en-IN" dirty="0"/>
+              <a:t>Subscribe Method</a:t>
+            </a:r>
+          </a:p>
+          <a:p>
+            <a:endParaRPr lang="en-IN" dirty="0"/>
+          </a:p>
+          <a:p>
+            <a:endParaRPr lang="en-IN" dirty="0"/>
+          </a:p>
+          <a:p>
+            <a:endParaRPr lang="en-IN" dirty="0"/>
+          </a:p>
+          <a:p>
+            <a:endParaRPr lang="en-IN" dirty="0"/>
+          </a:p>
+        </p:txBody>
+      </p:sp>
+    </p:spTree>
+    <p:extLst>
+      <p:ext uri="{BB962C8B-B14F-4D97-AF65-F5344CB8AC3E}">
+        <p14:creationId xmlns:p14="http://schemas.microsoft.com/office/powerpoint/2010/main" val="3472435868"/>
+      </p:ext>
+    </p:extLst>
+  </p:cSld>
+  <p:clrMapOvr>
+    <a:masterClrMapping/>
+  </p:clrMapOvr>
+</p:sld>
+</file>
+
+<file path=ppt/slides/slide17.xml><?xml version="1.0" encoding="utf-8"?>
+<p:sld xmlns:a="http://schemas.openxmlformats.org/drawingml/2006/main" xmlns:r="http://schemas.openxmlformats.org/officeDocument/2006/relationships" xmlns:p="http://schemas.openxmlformats.org/presentationml/2006/main">
+  <p:cSld>
+    <p:bg>
+      <p:bgPr>
+        <a:blipFill dpi="0" rotWithShape="1">
+          <a:blip r:embed="rId2">
+            <a:lum/>
+          </a:blip>
+          <a:srcRect/>
+          <a:stretch>
+            <a:fillRect l="-3000" r="-3000"/>
+          </a:stretch>
+        </a:blipFill>
+        <a:effectLst/>
+      </p:bgPr>
+    </p:bg>
+    <p:spTree>
+      <p:nvGrpSpPr>
+        <p:cNvPr id="1" name=""/>
+        <p:cNvGrpSpPr/>
+        <p:nvPr/>
+      </p:nvGrpSpPr>
+      <p:grpSpPr>
+        <a:xfrm>
+          <a:off x="0" y="0"/>
+          <a:ext cx="0" cy="0"/>
+          <a:chOff x="0" y="0"/>
+          <a:chExt cx="0" cy="0"/>
+        </a:xfrm>
+      </p:grpSpPr>
+      <p:sp>
+        <p:nvSpPr>
+          <p:cNvPr id="2" name="Title 1">
+            <a:extLst>
+              <a:ext uri="{FF2B5EF4-FFF2-40B4-BE49-F238E27FC236}">
+                <a16:creationId xmlns:a16="http://schemas.microsoft.com/office/drawing/2014/main" id="{7D51799D-4E26-BEC4-533A-E441F51DFF60}"/>
+              </a:ext>
+            </a:extLst>
+          </p:cNvPr>
+          <p:cNvSpPr>
+            <a:spLocks noGrp="1"/>
+          </p:cNvSpPr>
+          <p:nvPr>
+            <p:ph type="title"/>
+          </p:nvPr>
+        </p:nvSpPr>
+        <p:spPr/>
+        <p:txBody>
+          <a:bodyPr>
+            <a:normAutofit/>
+          </a:bodyPr>
+          <a:lstStyle/>
+          <a:p>
+            <a:pPr algn="l"/>
+            <a:r>
+              <a:rPr lang="en-IN" sz="5400" b="1" dirty="0"/>
+              <a:t>Observables &amp; Promises</a:t>
+            </a:r>
+          </a:p>
+        </p:txBody>
+      </p:sp>
+      <p:sp>
+        <p:nvSpPr>
+          <p:cNvPr id="4" name="Content Placeholder 3">
+            <a:extLst>
+              <a:ext uri="{FF2B5EF4-FFF2-40B4-BE49-F238E27FC236}">
+                <a16:creationId xmlns:a16="http://schemas.microsoft.com/office/drawing/2014/main" id="{FDD5958A-281A-314D-BF1A-CB03B73B1726}"/>
+              </a:ext>
+            </a:extLst>
+          </p:cNvPr>
+          <p:cNvSpPr>
+            <a:spLocks noGrp="1"/>
+          </p:cNvSpPr>
+          <p:nvPr>
+            <p:ph idx="1"/>
+          </p:nvPr>
+        </p:nvSpPr>
+        <p:spPr/>
+        <p:txBody>
+          <a:bodyPr/>
+          <a:lstStyle/>
+          <a:p>
+            <a:r>
+              <a:rPr lang="en-IN" dirty="0"/>
+              <a:t>Promise is Native whereas Observable is from RXJS</a:t>
+            </a:r>
+          </a:p>
+          <a:p>
+            <a:r>
+              <a:rPr lang="en-IN" dirty="0"/>
+              <a:t>Handles Async Data</a:t>
+            </a:r>
+          </a:p>
+          <a:p>
+            <a:endParaRPr lang="en-IN" dirty="0"/>
+          </a:p>
+          <a:p>
+            <a:endParaRPr lang="en-IN" dirty="0"/>
+          </a:p>
+        </p:txBody>
+      </p:sp>
+      <p:graphicFrame>
+        <p:nvGraphicFramePr>
+          <p:cNvPr id="3" name="Table 4">
+            <a:extLst>
+              <a:ext uri="{FF2B5EF4-FFF2-40B4-BE49-F238E27FC236}">
+                <a16:creationId xmlns:a16="http://schemas.microsoft.com/office/drawing/2014/main" id="{7F2A2496-0B0D-8161-2A65-ACF6F91821A0}"/>
+              </a:ext>
+            </a:extLst>
+          </p:cNvPr>
+          <p:cNvGraphicFramePr>
+            <a:graphicFrameLocks noGrp="1"/>
+          </p:cNvGraphicFramePr>
+          <p:nvPr>
+            <p:extLst>
+              <p:ext uri="{D42A27DB-BD31-4B8C-83A1-F6EECF244321}">
+                <p14:modId xmlns:p14="http://schemas.microsoft.com/office/powerpoint/2010/main" val="432465093"/>
+              </p:ext>
+            </p:extLst>
+          </p:nvPr>
+        </p:nvGraphicFramePr>
+        <p:xfrm>
+          <a:off x="904875" y="2948412"/>
+          <a:ext cx="9163050" cy="3065628"/>
+        </p:xfrm>
+        <a:graphic>
+          <a:graphicData uri="http://schemas.openxmlformats.org/drawingml/2006/table">
+            <a:tbl>
+              <a:tblPr firstRow="1" bandRow="1">
+                <a:tableStyleId>{5C22544A-7EE6-4342-B048-85BDC9FD1C3A}</a:tableStyleId>
+              </a:tblPr>
+              <a:tblGrid>
+                <a:gridCol w="4581525">
+                  <a:extLst>
+                    <a:ext uri="{9D8B030D-6E8A-4147-A177-3AD203B41FA5}">
+                      <a16:colId xmlns:a16="http://schemas.microsoft.com/office/drawing/2014/main" val="2020037994"/>
+                    </a:ext>
+                  </a:extLst>
+                </a:gridCol>
+                <a:gridCol w="4581525">
+                  <a:extLst>
+                    <a:ext uri="{9D8B030D-6E8A-4147-A177-3AD203B41FA5}">
+                      <a16:colId xmlns:a16="http://schemas.microsoft.com/office/drawing/2014/main" val="3975375683"/>
+                    </a:ext>
+                  </a:extLst>
+                </a:gridCol>
+              </a:tblGrid>
+              <a:tr h="236255">
+                <a:tc>
+                  <a:txBody>
+                    <a:bodyPr/>
+                    <a:lstStyle/>
+                    <a:p>
+                      <a:r>
+                        <a:rPr lang="en-IN" dirty="0"/>
+                        <a:t>Promise</a:t>
+                      </a:r>
+                    </a:p>
+                  </a:txBody>
+                  <a:tcPr>
+                    <a:lnB w="38100" cmpd="sng">
+                      <a:noFill/>
+                    </a:lnB>
+                  </a:tcPr>
+                </a:tc>
+                <a:tc>
+                  <a:txBody>
+                    <a:bodyPr/>
+                    <a:lstStyle/>
+                    <a:p>
+                      <a:r>
+                        <a:rPr lang="en-IN" dirty="0"/>
+                        <a:t>Observable</a:t>
+                      </a:r>
+                    </a:p>
+                  </a:txBody>
+                  <a:tcPr/>
+                </a:tc>
+                <a:extLst>
+                  <a:ext uri="{0D108BD9-81ED-4DB2-BD59-A6C34878D82A}">
+                    <a16:rowId xmlns:a16="http://schemas.microsoft.com/office/drawing/2014/main" val="162166048"/>
+                  </a:ext>
+                </a:extLst>
+              </a:tr>
+              <a:tr h="343377">
+                <a:tc>
+                  <a:txBody>
+                    <a:bodyPr/>
+                    <a:lstStyle/>
+                    <a:p>
+                      <a:r>
+                        <a:rPr lang="en-IN" dirty="0"/>
+                        <a:t>Eager</a:t>
+                      </a:r>
+                    </a:p>
+                  </a:txBody>
+                  <a:tcPr>
+                    <a:lnL w="12700" cmpd="sng">
+                      <a:noFill/>
+                    </a:lnL>
+                    <a:lnR w="12700" cmpd="sng">
+                      <a:noFill/>
+                    </a:lnR>
+                    <a:lnT w="38100" cmpd="sng">
+                      <a:noFill/>
+                    </a:lnT>
+                    <a:lnB w="12700" cmpd="sng">
+                      <a:noFill/>
+                    </a:lnB>
+                    <a:lnTlToBr w="12700" cmpd="sng">
+                      <a:noFill/>
+                      <a:prstDash val="solid"/>
+                    </a:lnTlToBr>
+                    <a:lnBlToTr w="12700" cmpd="sng">
+                      <a:noFill/>
+                      <a:prstDash val="solid"/>
+                    </a:lnBlToTr>
+                  </a:tcPr>
+                </a:tc>
+                <a:tc>
+                  <a:txBody>
+                    <a:bodyPr/>
+                    <a:lstStyle/>
+                    <a:p>
+                      <a:r>
+                        <a:rPr lang="en-IN" dirty="0"/>
+                        <a:t>Lazy</a:t>
+                      </a:r>
+                    </a:p>
+                  </a:txBody>
+                  <a:tcPr>
+                    <a:lnL w="12700" cmpd="sng">
+                      <a:noFill/>
+                    </a:lnL>
+                  </a:tcPr>
+                </a:tc>
+                <a:extLst>
+                  <a:ext uri="{0D108BD9-81ED-4DB2-BD59-A6C34878D82A}">
+                    <a16:rowId xmlns:a16="http://schemas.microsoft.com/office/drawing/2014/main" val="782463615"/>
+                  </a:ext>
+                </a:extLst>
+              </a:tr>
+              <a:tr h="343377">
+                <a:tc>
+                  <a:txBody>
+                    <a:bodyPr/>
+                    <a:lstStyle/>
+                    <a:p>
+                      <a:r>
+                        <a:rPr lang="en-IN" dirty="0"/>
+                        <a:t>then()</a:t>
+                      </a:r>
+                    </a:p>
+                  </a:txBody>
+                  <a:tcPr>
+                    <a:lnT w="12700" cmpd="sng">
+                      <a:noFill/>
+                    </a:lnT>
+                  </a:tcPr>
+                </a:tc>
+                <a:tc>
+                  <a:txBody>
+                    <a:bodyPr/>
+                    <a:lstStyle/>
+                    <a:p>
+                      <a:r>
+                        <a:rPr lang="en-IN" dirty="0"/>
+                        <a:t>subscribe()</a:t>
+                      </a:r>
+                    </a:p>
+                  </a:txBody>
+                  <a:tcPr/>
+                </a:tc>
+                <a:extLst>
+                  <a:ext uri="{0D108BD9-81ED-4DB2-BD59-A6C34878D82A}">
+                    <a16:rowId xmlns:a16="http://schemas.microsoft.com/office/drawing/2014/main" val="3133856968"/>
+                  </a:ext>
+                </a:extLst>
+              </a:tr>
+              <a:tr h="343377">
+                <a:tc>
+                  <a:txBody>
+                    <a:bodyPr/>
+                    <a:lstStyle/>
+                    <a:p>
+                      <a:r>
+                        <a:rPr lang="en-IN" dirty="0"/>
+                        <a:t>returns single value</a:t>
+                      </a:r>
+                    </a:p>
+                  </a:txBody>
+                  <a:tcPr/>
+                </a:tc>
+                <a:tc>
+                  <a:txBody>
+                    <a:bodyPr/>
+                    <a:lstStyle/>
+                    <a:p>
+                      <a:r>
+                        <a:rPr lang="en-IN"/>
+                        <a:t>Returns Multiple Values</a:t>
+                      </a:r>
+                      <a:endParaRPr lang="en-IN" dirty="0"/>
+                    </a:p>
+                  </a:txBody>
+                  <a:tcPr/>
+                </a:tc>
+                <a:extLst>
+                  <a:ext uri="{0D108BD9-81ED-4DB2-BD59-A6C34878D82A}">
+                    <a16:rowId xmlns:a16="http://schemas.microsoft.com/office/drawing/2014/main" val="1827516279"/>
+                  </a:ext>
+                </a:extLst>
+              </a:tr>
+              <a:tr h="688188">
+                <a:tc>
+                  <a:txBody>
+                    <a:bodyPr/>
+                    <a:lstStyle/>
+                    <a:p>
+                      <a:r>
+                        <a:rPr lang="en-IN" dirty="0"/>
+                        <a:t>No Operators</a:t>
+                      </a:r>
+                    </a:p>
+                  </a:txBody>
+                  <a:tcPr/>
+                </a:tc>
+                <a:tc>
+                  <a:txBody>
+                    <a:bodyPr/>
+                    <a:lstStyle/>
+                    <a:p>
+                      <a:r>
+                        <a:rPr lang="en-IN" dirty="0"/>
+                        <a:t>Observable acts as an array and we can apply operators provided by RXJS to manipulate data.</a:t>
+                      </a:r>
+                    </a:p>
+                  </a:txBody>
+                  <a:tcPr/>
+                </a:tc>
+                <a:extLst>
+                  <a:ext uri="{0D108BD9-81ED-4DB2-BD59-A6C34878D82A}">
+                    <a16:rowId xmlns:a16="http://schemas.microsoft.com/office/drawing/2014/main" val="1024171505"/>
+                  </a:ext>
+                </a:extLst>
+              </a:tr>
+              <a:tr h="688188">
+                <a:tc>
+                  <a:txBody>
+                    <a:bodyPr/>
+                    <a:lstStyle/>
+                    <a:p>
+                      <a:endParaRPr lang="en-IN" dirty="0"/>
+                    </a:p>
+                  </a:txBody>
+                  <a:tcPr/>
+                </a:tc>
+                <a:tc>
+                  <a:txBody>
+                    <a:bodyPr/>
+                    <a:lstStyle/>
+                    <a:p>
+                      <a:r>
+                        <a:rPr lang="en-IN" dirty="0"/>
+                        <a:t>Unsubscribe() to stop the subscription and restrict memory leaks.</a:t>
+                      </a:r>
+                    </a:p>
+                  </a:txBody>
+                  <a:tcPr/>
+                </a:tc>
+                <a:extLst>
+                  <a:ext uri="{0D108BD9-81ED-4DB2-BD59-A6C34878D82A}">
+                    <a16:rowId xmlns:a16="http://schemas.microsoft.com/office/drawing/2014/main" val="3724903600"/>
+                  </a:ext>
+                </a:extLst>
+              </a:tr>
+            </a:tbl>
+          </a:graphicData>
+        </a:graphic>
+      </p:graphicFrame>
+    </p:spTree>
+    <p:extLst>
+      <p:ext uri="{BB962C8B-B14F-4D97-AF65-F5344CB8AC3E}">
+        <p14:creationId xmlns:p14="http://schemas.microsoft.com/office/powerpoint/2010/main" val="177378959"/>
+      </p:ext>
+    </p:extLst>
+  </p:cSld>
+  <p:clrMapOvr>
+    <a:masterClrMapping/>
+  </p:clrMapOvr>
+</p:sld>
+</file>
+
+<file path=ppt/slides/slide18.xml><?xml version="1.0" encoding="utf-8"?>
+<p:sld xmlns:a="http://schemas.openxmlformats.org/drawingml/2006/main" xmlns:r="http://schemas.openxmlformats.org/officeDocument/2006/relationships" xmlns:p="http://schemas.openxmlformats.org/presentationml/2006/main">
+  <p:cSld>
+    <p:bg>
+      <p:bgPr>
+        <a:blipFill dpi="0" rotWithShape="1">
+          <a:blip r:embed="rId2">
+            <a:lum/>
+          </a:blip>
+          <a:srcRect/>
+          <a:stretch>
+            <a:fillRect l="-3000" r="-3000"/>
+          </a:stretch>
+        </a:blipFill>
+        <a:effectLst/>
+      </p:bgPr>
+    </p:bg>
+    <p:spTree>
+      <p:nvGrpSpPr>
+        <p:cNvPr id="1" name=""/>
+        <p:cNvGrpSpPr/>
+        <p:nvPr/>
+      </p:nvGrpSpPr>
+      <p:grpSpPr>
+        <a:xfrm>
+          <a:off x="0" y="0"/>
+          <a:ext cx="0" cy="0"/>
+          <a:chOff x="0" y="0"/>
+          <a:chExt cx="0" cy="0"/>
+        </a:xfrm>
+      </p:grpSpPr>
+      <p:sp>
+        <p:nvSpPr>
+          <p:cNvPr id="2" name="Title 1">
+            <a:extLst>
+              <a:ext uri="{FF2B5EF4-FFF2-40B4-BE49-F238E27FC236}">
+                <a16:creationId xmlns:a16="http://schemas.microsoft.com/office/drawing/2014/main" id="{7D51799D-4E26-BEC4-533A-E441F51DFF60}"/>
+              </a:ext>
+            </a:extLst>
+          </p:cNvPr>
+          <p:cNvSpPr>
+            <a:spLocks noGrp="1"/>
+          </p:cNvSpPr>
+          <p:nvPr>
+            <p:ph type="title"/>
+          </p:nvPr>
+        </p:nvSpPr>
+        <p:spPr/>
+        <p:txBody>
+          <a:bodyPr>
+            <a:normAutofit/>
+          </a:bodyPr>
+          <a:lstStyle/>
+          <a:p>
+            <a:pPr algn="l"/>
+            <a:r>
+              <a:rPr lang="en-IN" sz="5400" b="1" dirty="0"/>
+              <a:t>Observable &amp; Subject</a:t>
+            </a:r>
+          </a:p>
+        </p:txBody>
+      </p:sp>
+      <p:sp>
+        <p:nvSpPr>
+          <p:cNvPr id="4" name="Content Placeholder 3">
+            <a:extLst>
+              <a:ext uri="{FF2B5EF4-FFF2-40B4-BE49-F238E27FC236}">
+                <a16:creationId xmlns:a16="http://schemas.microsoft.com/office/drawing/2014/main" id="{FDD5958A-281A-314D-BF1A-CB03B73B1726}"/>
+              </a:ext>
+            </a:extLst>
+          </p:cNvPr>
+          <p:cNvSpPr>
+            <a:spLocks noGrp="1"/>
+          </p:cNvSpPr>
+          <p:nvPr>
+            <p:ph idx="1"/>
+          </p:nvPr>
+        </p:nvSpPr>
+        <p:spPr/>
+        <p:txBody>
+          <a:bodyPr>
+            <a:normAutofit lnSpcReduction="10000"/>
+          </a:bodyPr>
+          <a:lstStyle/>
+          <a:p>
+            <a:r>
+              <a:rPr lang="en-IN" dirty="0"/>
+              <a:t>Observable and Subject both are provided by RXJS</a:t>
+            </a:r>
+          </a:p>
+          <a:p>
+            <a:r>
+              <a:rPr lang="en-IN" dirty="0"/>
+              <a:t>To overcome drawbacks of observable we can use subject.</a:t>
+            </a:r>
+          </a:p>
+          <a:p>
+            <a:endParaRPr lang="en-IN" dirty="0"/>
+          </a:p>
+          <a:p>
+            <a:endParaRPr lang="en-IN" dirty="0"/>
+          </a:p>
+          <a:p>
+            <a:endParaRPr lang="en-IN" dirty="0"/>
+          </a:p>
+          <a:p>
+            <a:endParaRPr lang="en-IN" dirty="0"/>
+          </a:p>
+          <a:p>
+            <a:endParaRPr lang="en-IN" dirty="0"/>
+          </a:p>
+          <a:p>
+            <a:r>
+              <a:rPr lang="en-IN" dirty="0"/>
+              <a:t>In real-time subject can be used to reduce the same API calls for multiple subscribers</a:t>
+            </a:r>
+          </a:p>
+        </p:txBody>
+      </p:sp>
+      <p:graphicFrame>
+        <p:nvGraphicFramePr>
+          <p:cNvPr id="5" name="Table 4">
+            <a:extLst>
+              <a:ext uri="{FF2B5EF4-FFF2-40B4-BE49-F238E27FC236}">
+                <a16:creationId xmlns:a16="http://schemas.microsoft.com/office/drawing/2014/main" id="{20257E89-3A16-9C84-2B1A-B7589BF9C3B8}"/>
+              </a:ext>
+            </a:extLst>
+          </p:cNvPr>
+          <p:cNvGraphicFramePr>
+            <a:graphicFrameLocks/>
+          </p:cNvGraphicFramePr>
+          <p:nvPr>
+            <p:extLst>
+              <p:ext uri="{D42A27DB-BD31-4B8C-83A1-F6EECF244321}">
+                <p14:modId xmlns:p14="http://schemas.microsoft.com/office/powerpoint/2010/main" val="3497892086"/>
+              </p:ext>
+            </p:extLst>
+          </p:nvPr>
+        </p:nvGraphicFramePr>
+        <p:xfrm>
+          <a:off x="1647825" y="2857500"/>
+          <a:ext cx="7715250" cy="2121224"/>
+        </p:xfrm>
+        <a:graphic>
+          <a:graphicData uri="http://schemas.openxmlformats.org/drawingml/2006/table">
+            <a:tbl>
+              <a:tblPr firstRow="1" bandRow="1">
+                <a:tableStyleId>{5C22544A-7EE6-4342-B048-85BDC9FD1C3A}</a:tableStyleId>
+              </a:tblPr>
+              <a:tblGrid>
+                <a:gridCol w="3857625">
+                  <a:extLst>
+                    <a:ext uri="{9D8B030D-6E8A-4147-A177-3AD203B41FA5}">
+                      <a16:colId xmlns:a16="http://schemas.microsoft.com/office/drawing/2014/main" val="2523339177"/>
+                    </a:ext>
+                  </a:extLst>
+                </a:gridCol>
+                <a:gridCol w="3857625">
+                  <a:extLst>
+                    <a:ext uri="{9D8B030D-6E8A-4147-A177-3AD203B41FA5}">
+                      <a16:colId xmlns:a16="http://schemas.microsoft.com/office/drawing/2014/main" val="1457071020"/>
+                    </a:ext>
+                  </a:extLst>
+                </a:gridCol>
+              </a:tblGrid>
+              <a:tr h="370286">
+                <a:tc>
+                  <a:txBody>
+                    <a:bodyPr/>
+                    <a:lstStyle/>
+                    <a:p>
+                      <a:r>
+                        <a:rPr lang="en-IN" dirty="0"/>
+                        <a:t>Observable</a:t>
+                      </a:r>
+                    </a:p>
+                  </a:txBody>
+                  <a:tcPr/>
+                </a:tc>
+                <a:tc>
+                  <a:txBody>
+                    <a:bodyPr/>
+                    <a:lstStyle/>
+                    <a:p>
+                      <a:r>
+                        <a:rPr lang="en-IN" dirty="0"/>
+                        <a:t>Subject</a:t>
+                      </a:r>
+                    </a:p>
+                  </a:txBody>
+                  <a:tcPr/>
+                </a:tc>
+                <a:extLst>
+                  <a:ext uri="{0D108BD9-81ED-4DB2-BD59-A6C34878D82A}">
+                    <a16:rowId xmlns:a16="http://schemas.microsoft.com/office/drawing/2014/main" val="1689711414"/>
+                  </a:ext>
+                </a:extLst>
+              </a:tr>
+              <a:tr h="370286">
+                <a:tc>
+                  <a:txBody>
+                    <a:bodyPr/>
+                    <a:lstStyle/>
+                    <a:p>
+                      <a:r>
+                        <a:rPr lang="en-IN" dirty="0"/>
+                        <a:t>Unicast</a:t>
+                      </a:r>
+                    </a:p>
+                  </a:txBody>
+                  <a:tcPr/>
+                </a:tc>
+                <a:tc>
+                  <a:txBody>
+                    <a:bodyPr/>
+                    <a:lstStyle/>
+                    <a:p>
+                      <a:r>
+                        <a:rPr lang="en-IN" dirty="0"/>
+                        <a:t>Multicast</a:t>
+                      </a:r>
+                    </a:p>
+                  </a:txBody>
+                  <a:tcPr/>
+                </a:tc>
+                <a:extLst>
+                  <a:ext uri="{0D108BD9-81ED-4DB2-BD59-A6C34878D82A}">
+                    <a16:rowId xmlns:a16="http://schemas.microsoft.com/office/drawing/2014/main" val="1138895529"/>
+                  </a:ext>
+                </a:extLst>
+              </a:tr>
+              <a:tr h="370286">
+                <a:tc>
+                  <a:txBody>
+                    <a:bodyPr/>
+                    <a:lstStyle/>
+                    <a:p>
+                      <a:r>
+                        <a:rPr lang="en-IN" dirty="0"/>
+                        <a:t>One to one</a:t>
+                      </a:r>
+                    </a:p>
+                  </a:txBody>
+                  <a:tcPr/>
+                </a:tc>
+                <a:tc>
+                  <a:txBody>
+                    <a:bodyPr/>
+                    <a:lstStyle/>
+                    <a:p>
+                      <a:r>
+                        <a:rPr lang="en-IN" dirty="0"/>
+                        <a:t>One to many</a:t>
+                      </a:r>
+                    </a:p>
+                  </a:txBody>
+                  <a:tcPr/>
+                </a:tc>
+                <a:extLst>
+                  <a:ext uri="{0D108BD9-81ED-4DB2-BD59-A6C34878D82A}">
+                    <a16:rowId xmlns:a16="http://schemas.microsoft.com/office/drawing/2014/main" val="2143121100"/>
+                  </a:ext>
+                </a:extLst>
+              </a:tr>
+              <a:tr h="370286">
+                <a:tc>
+                  <a:txBody>
+                    <a:bodyPr/>
+                    <a:lstStyle/>
+                    <a:p>
+                      <a:r>
+                        <a:rPr lang="en-IN" dirty="0"/>
+                        <a:t>next() method to take input</a:t>
+                      </a:r>
+                    </a:p>
+                  </a:txBody>
+                  <a:tcPr/>
+                </a:tc>
+                <a:tc>
+                  <a:txBody>
+                    <a:bodyPr/>
+                    <a:lstStyle/>
+                    <a:p>
+                      <a:pPr marL="0" marR="0" lvl="0" indent="0" algn="l" defTabSz="914400" rtl="0" eaLnBrk="1" fontAlgn="auto" latinLnBrk="0" hangingPunct="1">
+                        <a:lnSpc>
+                          <a:spcPct val="100000"/>
+                        </a:lnSpc>
+                        <a:spcBef>
+                          <a:spcPts val="0"/>
+                        </a:spcBef>
+                        <a:spcAft>
+                          <a:spcPts val="0"/>
+                        </a:spcAft>
+                        <a:buClrTx/>
+                        <a:buSzTx/>
+                        <a:buFontTx/>
+                        <a:buNone/>
+                        <a:tabLst/>
+                        <a:defRPr/>
+                      </a:pPr>
+                      <a:r>
+                        <a:rPr lang="en-IN" dirty="0"/>
+                        <a:t>next() method to take input</a:t>
+                      </a:r>
+                    </a:p>
+                  </a:txBody>
+                  <a:tcPr/>
+                </a:tc>
+                <a:extLst>
+                  <a:ext uri="{0D108BD9-81ED-4DB2-BD59-A6C34878D82A}">
+                    <a16:rowId xmlns:a16="http://schemas.microsoft.com/office/drawing/2014/main" val="710602207"/>
+                  </a:ext>
+                </a:extLst>
+              </a:tr>
+              <a:tr h="639123">
+                <a:tc>
+                  <a:txBody>
+                    <a:bodyPr/>
+                    <a:lstStyle/>
+                    <a:p>
+                      <a:endParaRPr lang="en-IN" dirty="0"/>
+                    </a:p>
+                  </a:txBody>
+                  <a:tcPr/>
+                </a:tc>
+                <a:tc>
+                  <a:txBody>
+                    <a:bodyPr/>
+                    <a:lstStyle/>
+                    <a:p>
+                      <a:r>
+                        <a:rPr lang="en-IN" dirty="0"/>
+                        <a:t>Subject can be a data provider as well as a data consumer.</a:t>
+                      </a:r>
+                    </a:p>
+                  </a:txBody>
+                  <a:tcPr/>
+                </a:tc>
+                <a:extLst>
+                  <a:ext uri="{0D108BD9-81ED-4DB2-BD59-A6C34878D82A}">
+                    <a16:rowId xmlns:a16="http://schemas.microsoft.com/office/drawing/2014/main" val="4006380770"/>
+                  </a:ext>
+                </a:extLst>
+              </a:tr>
+            </a:tbl>
+          </a:graphicData>
+        </a:graphic>
+      </p:graphicFrame>
+    </p:spTree>
+    <p:extLst>
+      <p:ext uri="{BB962C8B-B14F-4D97-AF65-F5344CB8AC3E}">
+        <p14:creationId xmlns:p14="http://schemas.microsoft.com/office/powerpoint/2010/main" val="1656324665"/>
+      </p:ext>
+    </p:extLst>
+  </p:cSld>
+  <p:clrMapOvr>
+    <a:masterClrMapping/>
+  </p:clrMapOvr>
+</p:sld>
+</file>
+
+<file path=ppt/slides/slide19.xml><?xml version="1.0" encoding="utf-8"?>
+<p:sld xmlns:a="http://schemas.openxmlformats.org/drawingml/2006/main" xmlns:r="http://schemas.openxmlformats.org/officeDocument/2006/relationships" xmlns:p="http://schemas.openxmlformats.org/presentationml/2006/main">
+  <p:cSld>
+    <p:bg>
+      <p:bgPr>
+        <a:blipFill dpi="0" rotWithShape="1">
+          <a:blip r:embed="rId2">
+            <a:lum/>
+          </a:blip>
+          <a:srcRect/>
+          <a:stretch>
+            <a:fillRect l="-3000" r="-3000"/>
+          </a:stretch>
+        </a:blipFill>
+        <a:effectLst/>
+      </p:bgPr>
+    </p:bg>
+    <p:spTree>
+      <p:nvGrpSpPr>
+        <p:cNvPr id="1" name=""/>
+        <p:cNvGrpSpPr/>
+        <p:nvPr/>
+      </p:nvGrpSpPr>
+      <p:grpSpPr>
+        <a:xfrm>
+          <a:off x="0" y="0"/>
+          <a:ext cx="0" cy="0"/>
+          <a:chOff x="0" y="0"/>
+          <a:chExt cx="0" cy="0"/>
+        </a:xfrm>
+      </p:grpSpPr>
+      <p:sp>
+        <p:nvSpPr>
+          <p:cNvPr id="2" name="Title 1">
+            <a:extLst>
+              <a:ext uri="{FF2B5EF4-FFF2-40B4-BE49-F238E27FC236}">
+                <a16:creationId xmlns:a16="http://schemas.microsoft.com/office/drawing/2014/main" id="{7D51799D-4E26-BEC4-533A-E441F51DFF60}"/>
+              </a:ext>
+            </a:extLst>
+          </p:cNvPr>
+          <p:cNvSpPr>
+            <a:spLocks noGrp="1"/>
+          </p:cNvSpPr>
+          <p:nvPr>
+            <p:ph type="title"/>
+          </p:nvPr>
+        </p:nvSpPr>
+        <p:spPr/>
+        <p:txBody>
+          <a:bodyPr>
+            <a:normAutofit/>
+          </a:bodyPr>
+          <a:lstStyle/>
+          <a:p>
+            <a:pPr algn="l"/>
+            <a:r>
+              <a:rPr lang="en-IN" sz="5400" b="1" dirty="0"/>
+              <a:t>Behavior Subject</a:t>
+            </a:r>
+          </a:p>
+        </p:txBody>
+      </p:sp>
+      <p:sp>
+        <p:nvSpPr>
+          <p:cNvPr id="4" name="Content Placeholder 3">
+            <a:extLst>
+              <a:ext uri="{FF2B5EF4-FFF2-40B4-BE49-F238E27FC236}">
+                <a16:creationId xmlns:a16="http://schemas.microsoft.com/office/drawing/2014/main" id="{FDD5958A-281A-314D-BF1A-CB03B73B1726}"/>
+              </a:ext>
+            </a:extLst>
+          </p:cNvPr>
+          <p:cNvSpPr>
+            <a:spLocks noGrp="1"/>
+          </p:cNvSpPr>
+          <p:nvPr>
+            <p:ph idx="1"/>
+          </p:nvPr>
+        </p:nvSpPr>
+        <p:spPr/>
+        <p:txBody>
+          <a:bodyPr/>
+          <a:lstStyle/>
+          <a:p>
+            <a:r>
+              <a:rPr lang="en-IN" dirty="0"/>
+              <a:t>Behaviour Subject is a kind of subject which always holds a value.</a:t>
+            </a:r>
+          </a:p>
+          <a:p>
+            <a:r>
+              <a:rPr lang="en-IN" dirty="0"/>
+              <a:t>Subject should have a value to subscribe</a:t>
+            </a:r>
+          </a:p>
+          <a:p>
+            <a:r>
+              <a:rPr lang="en-IN" dirty="0"/>
+              <a:t>Behavior subject can hold an initial value or last emitted value.</a:t>
+            </a:r>
+          </a:p>
+          <a:p>
+            <a:r>
+              <a:rPr lang="en-IN" dirty="0"/>
+              <a:t>Subject and Behavior Subject can also be used for Communication between components using a service.</a:t>
+            </a:r>
+          </a:p>
+          <a:p>
+            <a:pPr marL="0" indent="0">
+              <a:buNone/>
+            </a:pPr>
+            <a:endParaRPr lang="en-IN" dirty="0"/>
+          </a:p>
+        </p:txBody>
+      </p:sp>
+    </p:spTree>
+    <p:extLst>
+      <p:ext uri="{BB962C8B-B14F-4D97-AF65-F5344CB8AC3E}">
+        <p14:creationId xmlns:p14="http://schemas.microsoft.com/office/powerpoint/2010/main" val="1515059089"/>
       </p:ext>
     </p:extLst>
   </p:cSld>
@@ -4485,6 +5584,349 @@
     <p:extLst>
       <p:ext uri="{BB962C8B-B14F-4D97-AF65-F5344CB8AC3E}">
         <p14:creationId xmlns:p14="http://schemas.microsoft.com/office/powerpoint/2010/main" val="1960867389"/>
+      </p:ext>
+    </p:extLst>
+  </p:cSld>
+  <p:clrMapOvr>
+    <a:masterClrMapping/>
+  </p:clrMapOvr>
+</p:sld>
+</file>
+
+<file path=ppt/slides/slide20.xml><?xml version="1.0" encoding="utf-8"?>
+<p:sld xmlns:a="http://schemas.openxmlformats.org/drawingml/2006/main" xmlns:r="http://schemas.openxmlformats.org/officeDocument/2006/relationships" xmlns:p="http://schemas.openxmlformats.org/presentationml/2006/main">
+  <p:cSld>
+    <p:bg>
+      <p:bgPr>
+        <a:blipFill dpi="0" rotWithShape="1">
+          <a:blip r:embed="rId2">
+            <a:lum/>
+          </a:blip>
+          <a:srcRect/>
+          <a:stretch>
+            <a:fillRect l="-3000" r="-3000"/>
+          </a:stretch>
+        </a:blipFill>
+        <a:effectLst/>
+      </p:bgPr>
+    </p:bg>
+    <p:spTree>
+      <p:nvGrpSpPr>
+        <p:cNvPr id="1" name=""/>
+        <p:cNvGrpSpPr/>
+        <p:nvPr/>
+      </p:nvGrpSpPr>
+      <p:grpSpPr>
+        <a:xfrm>
+          <a:off x="0" y="0"/>
+          <a:ext cx="0" cy="0"/>
+          <a:chOff x="0" y="0"/>
+          <a:chExt cx="0" cy="0"/>
+        </a:xfrm>
+      </p:grpSpPr>
+      <p:sp>
+        <p:nvSpPr>
+          <p:cNvPr id="2" name="Title 1">
+            <a:extLst>
+              <a:ext uri="{FF2B5EF4-FFF2-40B4-BE49-F238E27FC236}">
+                <a16:creationId xmlns:a16="http://schemas.microsoft.com/office/drawing/2014/main" id="{7D51799D-4E26-BEC4-533A-E441F51DFF60}"/>
+              </a:ext>
+            </a:extLst>
+          </p:cNvPr>
+          <p:cNvSpPr>
+            <a:spLocks noGrp="1"/>
+          </p:cNvSpPr>
+          <p:nvPr>
+            <p:ph type="title"/>
+          </p:nvPr>
+        </p:nvSpPr>
+        <p:spPr/>
+        <p:txBody>
+          <a:bodyPr>
+            <a:normAutofit/>
+          </a:bodyPr>
+          <a:lstStyle/>
+          <a:p>
+            <a:pPr algn="l"/>
+            <a:r>
+              <a:rPr lang="en-IN" sz="5400" b="1" dirty="0"/>
+              <a:t>Replay Subject	</a:t>
+            </a:r>
+          </a:p>
+        </p:txBody>
+      </p:sp>
+      <p:sp>
+        <p:nvSpPr>
+          <p:cNvPr id="4" name="Content Placeholder 3">
+            <a:extLst>
+              <a:ext uri="{FF2B5EF4-FFF2-40B4-BE49-F238E27FC236}">
+                <a16:creationId xmlns:a16="http://schemas.microsoft.com/office/drawing/2014/main" id="{FDD5958A-281A-314D-BF1A-CB03B73B1726}"/>
+              </a:ext>
+            </a:extLst>
+          </p:cNvPr>
+          <p:cNvSpPr>
+            <a:spLocks noGrp="1"/>
+          </p:cNvSpPr>
+          <p:nvPr>
+            <p:ph idx="1"/>
+          </p:nvPr>
+        </p:nvSpPr>
+        <p:spPr/>
+        <p:txBody>
+          <a:bodyPr/>
+          <a:lstStyle/>
+          <a:p>
+            <a:r>
+              <a:rPr lang="en-IN" dirty="0"/>
+              <a:t>Replay Subject is a variant of subject which emits old values to new subscribers.</a:t>
+            </a:r>
+          </a:p>
+          <a:p>
+            <a:r>
+              <a:rPr lang="en-IN" dirty="0"/>
+              <a:t>It don’t have an default value to hold like behavior subject.</a:t>
+            </a:r>
+          </a:p>
+          <a:p>
+            <a:r>
+              <a:rPr lang="en-IN" dirty="0"/>
+              <a:t>It uses next method to take input, same as other subjects.</a:t>
+            </a:r>
+          </a:p>
+          <a:p>
+            <a:r>
+              <a:rPr lang="en-IN" dirty="0"/>
+              <a:t>Replay subject takes buffer size as Initial value.</a:t>
+            </a:r>
+          </a:p>
+        </p:txBody>
+      </p:sp>
+    </p:spTree>
+    <p:extLst>
+      <p:ext uri="{BB962C8B-B14F-4D97-AF65-F5344CB8AC3E}">
+        <p14:creationId xmlns:p14="http://schemas.microsoft.com/office/powerpoint/2010/main" val="3147116080"/>
+      </p:ext>
+    </p:extLst>
+  </p:cSld>
+  <p:clrMapOvr>
+    <a:masterClrMapping/>
+  </p:clrMapOvr>
+</p:sld>
+</file>
+
+<file path=ppt/slides/slide21.xml><?xml version="1.0" encoding="utf-8"?>
+<p:sld xmlns:a="http://schemas.openxmlformats.org/drawingml/2006/main" xmlns:r="http://schemas.openxmlformats.org/officeDocument/2006/relationships" xmlns:p="http://schemas.openxmlformats.org/presentationml/2006/main">
+  <p:cSld>
+    <p:bg>
+      <p:bgPr>
+        <a:blipFill dpi="0" rotWithShape="1">
+          <a:blip r:embed="rId2">
+            <a:lum/>
+          </a:blip>
+          <a:srcRect/>
+          <a:stretch>
+            <a:fillRect l="-3000" r="-3000"/>
+          </a:stretch>
+        </a:blipFill>
+        <a:effectLst/>
+      </p:bgPr>
+    </p:bg>
+    <p:spTree>
+      <p:nvGrpSpPr>
+        <p:cNvPr id="1" name=""/>
+        <p:cNvGrpSpPr/>
+        <p:nvPr/>
+      </p:nvGrpSpPr>
+      <p:grpSpPr>
+        <a:xfrm>
+          <a:off x="0" y="0"/>
+          <a:ext cx="0" cy="0"/>
+          <a:chOff x="0" y="0"/>
+          <a:chExt cx="0" cy="0"/>
+        </a:xfrm>
+      </p:grpSpPr>
+      <p:sp>
+        <p:nvSpPr>
+          <p:cNvPr id="2" name="Title 1">
+            <a:extLst>
+              <a:ext uri="{FF2B5EF4-FFF2-40B4-BE49-F238E27FC236}">
+                <a16:creationId xmlns:a16="http://schemas.microsoft.com/office/drawing/2014/main" id="{7D51799D-4E26-BEC4-533A-E441F51DFF60}"/>
+              </a:ext>
+            </a:extLst>
+          </p:cNvPr>
+          <p:cNvSpPr>
+            <a:spLocks noGrp="1"/>
+          </p:cNvSpPr>
+          <p:nvPr>
+            <p:ph type="title"/>
+          </p:nvPr>
+        </p:nvSpPr>
+        <p:spPr/>
+        <p:txBody>
+          <a:bodyPr>
+            <a:normAutofit/>
+          </a:bodyPr>
+          <a:lstStyle/>
+          <a:p>
+            <a:pPr algn="l"/>
+            <a:r>
+              <a:rPr lang="en-IN" sz="5400" b="1" dirty="0"/>
+              <a:t>Async Subject</a:t>
+            </a:r>
+          </a:p>
+        </p:txBody>
+      </p:sp>
+      <p:sp>
+        <p:nvSpPr>
+          <p:cNvPr id="4" name="Content Placeholder 3">
+            <a:extLst>
+              <a:ext uri="{FF2B5EF4-FFF2-40B4-BE49-F238E27FC236}">
+                <a16:creationId xmlns:a16="http://schemas.microsoft.com/office/drawing/2014/main" id="{FDD5958A-281A-314D-BF1A-CB03B73B1726}"/>
+              </a:ext>
+            </a:extLst>
+          </p:cNvPr>
+          <p:cNvSpPr>
+            <a:spLocks noGrp="1"/>
+          </p:cNvSpPr>
+          <p:nvPr>
+            <p:ph idx="1"/>
+          </p:nvPr>
+        </p:nvSpPr>
+        <p:spPr/>
+        <p:txBody>
+          <a:bodyPr/>
+          <a:lstStyle/>
+          <a:p>
+            <a:r>
+              <a:rPr lang="en-IN" dirty="0"/>
+              <a:t>Async subject is a variant of subject which emits only the last value to all the subscribers.</a:t>
+            </a:r>
+          </a:p>
+          <a:p>
+            <a:r>
+              <a:rPr lang="en-IN" dirty="0"/>
+              <a:t>Complete() method.</a:t>
+            </a:r>
+          </a:p>
+          <a:p>
+            <a:r>
+              <a:rPr lang="en-IN" dirty="0"/>
+              <a:t>Async subject is similar to promise but promise is eager and async subject is lazy.</a:t>
+            </a:r>
+          </a:p>
+          <a:p>
+            <a:r>
+              <a:rPr lang="en-IN" dirty="0"/>
+              <a:t>In real-time,  when you want to call an API call which have only one value.</a:t>
+            </a:r>
+          </a:p>
+        </p:txBody>
+      </p:sp>
+    </p:spTree>
+    <p:extLst>
+      <p:ext uri="{BB962C8B-B14F-4D97-AF65-F5344CB8AC3E}">
+        <p14:creationId xmlns:p14="http://schemas.microsoft.com/office/powerpoint/2010/main" val="1514423450"/>
+      </p:ext>
+    </p:extLst>
+  </p:cSld>
+  <p:clrMapOvr>
+    <a:masterClrMapping/>
+  </p:clrMapOvr>
+</p:sld>
+</file>
+
+<file path=ppt/slides/slide22.xml><?xml version="1.0" encoding="utf-8"?>
+<p:sld xmlns:a="http://schemas.openxmlformats.org/drawingml/2006/main" xmlns:r="http://schemas.openxmlformats.org/officeDocument/2006/relationships" xmlns:p="http://schemas.openxmlformats.org/presentationml/2006/main">
+  <p:cSld>
+    <p:bg>
+      <p:bgPr>
+        <a:blipFill dpi="0" rotWithShape="1">
+          <a:blip r:embed="rId2">
+            <a:lum/>
+          </a:blip>
+          <a:srcRect/>
+          <a:stretch>
+            <a:fillRect l="-3000" r="-3000"/>
+          </a:stretch>
+        </a:blipFill>
+        <a:effectLst/>
+      </p:bgPr>
+    </p:bg>
+    <p:spTree>
+      <p:nvGrpSpPr>
+        <p:cNvPr id="1" name=""/>
+        <p:cNvGrpSpPr/>
+        <p:nvPr/>
+      </p:nvGrpSpPr>
+      <p:grpSpPr>
+        <a:xfrm>
+          <a:off x="0" y="0"/>
+          <a:ext cx="0" cy="0"/>
+          <a:chOff x="0" y="0"/>
+          <a:chExt cx="0" cy="0"/>
+        </a:xfrm>
+      </p:grpSpPr>
+      <p:sp>
+        <p:nvSpPr>
+          <p:cNvPr id="2" name="Title 1">
+            <a:extLst>
+              <a:ext uri="{FF2B5EF4-FFF2-40B4-BE49-F238E27FC236}">
+                <a16:creationId xmlns:a16="http://schemas.microsoft.com/office/drawing/2014/main" id="{7D51799D-4E26-BEC4-533A-E441F51DFF60}"/>
+              </a:ext>
+            </a:extLst>
+          </p:cNvPr>
+          <p:cNvSpPr>
+            <a:spLocks noGrp="1"/>
+          </p:cNvSpPr>
+          <p:nvPr>
+            <p:ph type="title"/>
+          </p:nvPr>
+        </p:nvSpPr>
+        <p:spPr/>
+        <p:txBody>
+          <a:bodyPr>
+            <a:normAutofit/>
+          </a:bodyPr>
+          <a:lstStyle/>
+          <a:p>
+            <a:pPr algn="l"/>
+            <a:endParaRPr lang="en-IN" sz="5400" b="1" dirty="0"/>
+          </a:p>
+        </p:txBody>
+      </p:sp>
+      <p:sp>
+        <p:nvSpPr>
+          <p:cNvPr id="4" name="Content Placeholder 3">
+            <a:extLst>
+              <a:ext uri="{FF2B5EF4-FFF2-40B4-BE49-F238E27FC236}">
+                <a16:creationId xmlns:a16="http://schemas.microsoft.com/office/drawing/2014/main" id="{FDD5958A-281A-314D-BF1A-CB03B73B1726}"/>
+              </a:ext>
+            </a:extLst>
+          </p:cNvPr>
+          <p:cNvSpPr>
+            <a:spLocks noGrp="1"/>
+          </p:cNvSpPr>
+          <p:nvPr>
+            <p:ph idx="1"/>
+          </p:nvPr>
+        </p:nvSpPr>
+        <p:spPr/>
+        <p:txBody>
+          <a:bodyPr/>
+          <a:lstStyle/>
+          <a:p>
+            <a:r>
+              <a:rPr lang="en-US" dirty="0"/>
+              <a:t>Home 	users     contact</a:t>
+            </a:r>
+            <a:endParaRPr lang="en-IN" dirty="0"/>
+          </a:p>
+        </p:txBody>
+      </p:sp>
+    </p:spTree>
+    <p:extLst>
+      <p:ext uri="{BB962C8B-B14F-4D97-AF65-F5344CB8AC3E}">
+        <p14:creationId xmlns:p14="http://schemas.microsoft.com/office/powerpoint/2010/main" val="4009756999"/>
       </p:ext>
     </p:extLst>
   </p:cSld>

</xml_diff>

<commit_message>
Routing, Route Params, Pipes,  Custom Pipes
</commit_message>
<xml_diff>
--- a/src/assets/AngularByRaharshi.pptx
+++ b/src/assets/AngularByRaharshi.pptx
@@ -285,7 +285,7 @@
           <a:p>
             <a:fld id="{5D6E5462-925E-44B2-A644-3CEFCF02BF6A}" type="datetimeFigureOut">
               <a:rPr lang="en-IN" smtClean="0"/>
-              <a:t>06-07-2022</a:t>
+              <a:t>07-07-2022</a:t>
             </a:fld>
             <a:endParaRPr lang="en-IN"/>
           </a:p>
@@ -485,7 +485,7 @@
           <a:p>
             <a:fld id="{5D6E5462-925E-44B2-A644-3CEFCF02BF6A}" type="datetimeFigureOut">
               <a:rPr lang="en-IN" smtClean="0"/>
-              <a:t>06-07-2022</a:t>
+              <a:t>07-07-2022</a:t>
             </a:fld>
             <a:endParaRPr lang="en-IN"/>
           </a:p>
@@ -695,7 +695,7 @@
           <a:p>
             <a:fld id="{5D6E5462-925E-44B2-A644-3CEFCF02BF6A}" type="datetimeFigureOut">
               <a:rPr lang="en-IN" smtClean="0"/>
-              <a:t>06-07-2022</a:t>
+              <a:t>07-07-2022</a:t>
             </a:fld>
             <a:endParaRPr lang="en-IN"/>
           </a:p>
@@ -895,7 +895,7 @@
           <a:p>
             <a:fld id="{5D6E5462-925E-44B2-A644-3CEFCF02BF6A}" type="datetimeFigureOut">
               <a:rPr lang="en-IN" smtClean="0"/>
-              <a:t>06-07-2022</a:t>
+              <a:t>07-07-2022</a:t>
             </a:fld>
             <a:endParaRPr lang="en-IN"/>
           </a:p>
@@ -1171,7 +1171,7 @@
           <a:p>
             <a:fld id="{5D6E5462-925E-44B2-A644-3CEFCF02BF6A}" type="datetimeFigureOut">
               <a:rPr lang="en-IN" smtClean="0"/>
-              <a:t>06-07-2022</a:t>
+              <a:t>07-07-2022</a:t>
             </a:fld>
             <a:endParaRPr lang="en-IN"/>
           </a:p>
@@ -1439,7 +1439,7 @@
           <a:p>
             <a:fld id="{5D6E5462-925E-44B2-A644-3CEFCF02BF6A}" type="datetimeFigureOut">
               <a:rPr lang="en-IN" smtClean="0"/>
-              <a:t>06-07-2022</a:t>
+              <a:t>07-07-2022</a:t>
             </a:fld>
             <a:endParaRPr lang="en-IN"/>
           </a:p>
@@ -1854,7 +1854,7 @@
           <a:p>
             <a:fld id="{5D6E5462-925E-44B2-A644-3CEFCF02BF6A}" type="datetimeFigureOut">
               <a:rPr lang="en-IN" smtClean="0"/>
-              <a:t>06-07-2022</a:t>
+              <a:t>07-07-2022</a:t>
             </a:fld>
             <a:endParaRPr lang="en-IN"/>
           </a:p>
@@ -1996,7 +1996,7 @@
           <a:p>
             <a:fld id="{5D6E5462-925E-44B2-A644-3CEFCF02BF6A}" type="datetimeFigureOut">
               <a:rPr lang="en-IN" smtClean="0"/>
-              <a:t>06-07-2022</a:t>
+              <a:t>07-07-2022</a:t>
             </a:fld>
             <a:endParaRPr lang="en-IN"/>
           </a:p>
@@ -2109,7 +2109,7 @@
           <a:p>
             <a:fld id="{5D6E5462-925E-44B2-A644-3CEFCF02BF6A}" type="datetimeFigureOut">
               <a:rPr lang="en-IN" smtClean="0"/>
-              <a:t>06-07-2022</a:t>
+              <a:t>07-07-2022</a:t>
             </a:fld>
             <a:endParaRPr lang="en-IN"/>
           </a:p>
@@ -2422,7 +2422,7 @@
           <a:p>
             <a:fld id="{5D6E5462-925E-44B2-A644-3CEFCF02BF6A}" type="datetimeFigureOut">
               <a:rPr lang="en-IN" smtClean="0"/>
-              <a:t>06-07-2022</a:t>
+              <a:t>07-07-2022</a:t>
             </a:fld>
             <a:endParaRPr lang="en-IN"/>
           </a:p>
@@ -2711,7 +2711,7 @@
           <a:p>
             <a:fld id="{5D6E5462-925E-44B2-A644-3CEFCF02BF6A}" type="datetimeFigureOut">
               <a:rPr lang="en-IN" smtClean="0"/>
-              <a:t>06-07-2022</a:t>
+              <a:t>07-07-2022</a:t>
             </a:fld>
             <a:endParaRPr lang="en-IN"/>
           </a:p>
@@ -2954,7 +2954,7 @@
           <a:p>
             <a:fld id="{5D6E5462-925E-44B2-A644-3CEFCF02BF6A}" type="datetimeFigureOut">
               <a:rPr lang="en-IN" smtClean="0"/>
-              <a:t>06-07-2022</a:t>
+              <a:t>07-07-2022</a:t>
             </a:fld>
             <a:endParaRPr lang="en-IN"/>
           </a:p>
@@ -5944,15 +5944,7 @@
           <a:p>
             <a:r>
               <a:rPr lang="en-US" dirty="0"/>
-              <a:t>Router-outlet -- </a:t>
-            </a:r>
-            <a:r>
-              <a:rPr lang="en-US"/>
-              <a:t>&lt;router-outlet&gt;&lt;/</a:t>
-            </a:r>
-            <a:r>
-              <a:rPr lang="en-US" dirty="0"/>
-              <a:t>router-outlet&gt;</a:t>
+              <a:t>Router-outlet -- &lt;router-outlet&gt;&lt;/router-outlet&gt;</a:t>
             </a:r>
           </a:p>
           <a:p>
@@ -5972,9 +5964,16 @@
             <a:pPr lvl="1"/>
             <a:r>
               <a:rPr lang="en-US" dirty="0"/>
-              <a:t>Router Params</a:t>
+              <a:t>Router Params -- ActivatedRoute</a:t>
             </a:r>
             <a:endParaRPr lang="en-IN" dirty="0"/>
+          </a:p>
+          <a:p>
+            <a:r>
+              <a:rPr lang="en-IN" dirty="0"/>
+              <a:t>Types of Navigation</a:t>
+            </a:r>
+            <a:endParaRPr lang="en-US" dirty="0"/>
           </a:p>
         </p:txBody>
       </p:sp>
@@ -6046,6 +6045,10 @@
           <a:lstStyle/>
           <a:p>
             <a:pPr algn="l"/>
+            <a:r>
+              <a:rPr lang="en-US" sz="5400" b="1" dirty="0"/>
+              <a:t>Pipes	</a:t>
+            </a:r>
             <a:endParaRPr lang="en-IN" sz="5400" b="1" dirty="0"/>
           </a:p>
         </p:txBody>
@@ -6071,6 +6074,72 @@
           <a:bodyPr/>
           <a:lstStyle/>
           <a:p>
+            <a:r>
+              <a:rPr lang="en-US" dirty="0"/>
+              <a:t>Defined Pipes</a:t>
+            </a:r>
+          </a:p>
+          <a:p>
+            <a:pPr lvl="1"/>
+            <a:r>
+              <a:rPr lang="en-US" dirty="0"/>
+              <a:t>Uppercase  -- uppercase</a:t>
+            </a:r>
+          </a:p>
+          <a:p>
+            <a:pPr lvl="1"/>
+            <a:r>
+              <a:rPr lang="en-US" dirty="0"/>
+              <a:t>Lowercase  -- lowercase</a:t>
+            </a:r>
+          </a:p>
+          <a:p>
+            <a:pPr lvl="1"/>
+            <a:r>
+              <a:rPr lang="en-US" dirty="0"/>
+              <a:t>Titlecase   -- titlecase</a:t>
+            </a:r>
+          </a:p>
+          <a:p>
+            <a:pPr lvl="1"/>
+            <a:r>
+              <a:rPr lang="en-US" dirty="0"/>
+              <a:t>Date	-- date : “dd/MM/yy”</a:t>
+            </a:r>
+          </a:p>
+          <a:p>
+            <a:pPr lvl="1"/>
+            <a:r>
+              <a:rPr lang="en-US" dirty="0"/>
+              <a:t>Json	-- json</a:t>
+            </a:r>
+          </a:p>
+          <a:p>
+            <a:pPr lvl="1"/>
+            <a:r>
+              <a:rPr lang="en-US" dirty="0"/>
+              <a:t>Currency -- currency: ”USD” “CAD” “INR”</a:t>
+            </a:r>
+          </a:p>
+          <a:p>
+            <a:pPr lvl="1"/>
+            <a:r>
+              <a:rPr lang="en-US" dirty="0"/>
+              <a:t>Decimal  -- number : “4.1-5”</a:t>
+            </a:r>
+          </a:p>
+          <a:p>
+            <a:pPr lvl="1"/>
+            <a:r>
+              <a:rPr lang="en-US" dirty="0"/>
+              <a:t>Percent  -- percent</a:t>
+            </a:r>
+          </a:p>
+          <a:p>
+            <a:r>
+              <a:rPr lang="en-US" dirty="0"/>
+              <a:t>Custom Pipes --  ng g pipe &lt;pipe-name&gt;</a:t>
+            </a:r>
             <a:endParaRPr lang="en-IN" dirty="0"/>
           </a:p>
         </p:txBody>
@@ -6168,6 +6237,10 @@
           <a:bodyPr/>
           <a:lstStyle/>
           <a:p>
+            <a:r>
+              <a:rPr lang="en-US" dirty="0"/>
+              <a:t>User/id</a:t>
+            </a:r>
             <a:endParaRPr lang="en-IN" dirty="0"/>
           </a:p>
         </p:txBody>

</xml_diff>